<commit_message>
Prace nad przekazywaniem danych do wątków bez uzycia głównego algorytmu
</commit_message>
<xml_diff>
--- a/Morphing obrazów [Automatycznie zapisany].pptx
+++ b/Morphing obrazów [Automatycznie zapisany].pptx
@@ -258,7 +258,7 @@
           <a:p>
             <a:fld id="{A7AF04E2-1FF2-44AF-8F21-A658C08EFBC7}" type="datetimeFigureOut">
               <a:rPr lang="pl-PL" smtClean="0"/>
-              <a:t>30.12.2020</a:t>
+              <a:t>08.01.2021</a:t>
             </a:fld>
             <a:endParaRPr lang="pl-PL"/>
           </a:p>
@@ -428,7 +428,7 @@
           <a:p>
             <a:fld id="{A7AF04E2-1FF2-44AF-8F21-A658C08EFBC7}" type="datetimeFigureOut">
               <a:rPr lang="pl-PL" smtClean="0"/>
-              <a:t>30.12.2020</a:t>
+              <a:t>08.01.2021</a:t>
             </a:fld>
             <a:endParaRPr lang="pl-PL"/>
           </a:p>
@@ -608,7 +608,7 @@
           <a:p>
             <a:fld id="{A7AF04E2-1FF2-44AF-8F21-A658C08EFBC7}" type="datetimeFigureOut">
               <a:rPr lang="pl-PL" smtClean="0"/>
-              <a:t>30.12.2020</a:t>
+              <a:t>08.01.2021</a:t>
             </a:fld>
             <a:endParaRPr lang="pl-PL"/>
           </a:p>
@@ -778,7 +778,7 @@
           <a:p>
             <a:fld id="{A7AF04E2-1FF2-44AF-8F21-A658C08EFBC7}" type="datetimeFigureOut">
               <a:rPr lang="pl-PL" smtClean="0"/>
-              <a:t>30.12.2020</a:t>
+              <a:t>08.01.2021</a:t>
             </a:fld>
             <a:endParaRPr lang="pl-PL"/>
           </a:p>
@@ -1024,7 +1024,7 @@
           <a:p>
             <a:fld id="{A7AF04E2-1FF2-44AF-8F21-A658C08EFBC7}" type="datetimeFigureOut">
               <a:rPr lang="pl-PL" smtClean="0"/>
-              <a:t>30.12.2020</a:t>
+              <a:t>08.01.2021</a:t>
             </a:fld>
             <a:endParaRPr lang="pl-PL"/>
           </a:p>
@@ -1256,7 +1256,7 @@
           <a:p>
             <a:fld id="{A7AF04E2-1FF2-44AF-8F21-A658C08EFBC7}" type="datetimeFigureOut">
               <a:rPr lang="pl-PL" smtClean="0"/>
-              <a:t>30.12.2020</a:t>
+              <a:t>08.01.2021</a:t>
             </a:fld>
             <a:endParaRPr lang="pl-PL"/>
           </a:p>
@@ -1623,7 +1623,7 @@
           <a:p>
             <a:fld id="{A7AF04E2-1FF2-44AF-8F21-A658C08EFBC7}" type="datetimeFigureOut">
               <a:rPr lang="pl-PL" smtClean="0"/>
-              <a:t>30.12.2020</a:t>
+              <a:t>08.01.2021</a:t>
             </a:fld>
             <a:endParaRPr lang="pl-PL"/>
           </a:p>
@@ -1741,7 +1741,7 @@
           <a:p>
             <a:fld id="{A7AF04E2-1FF2-44AF-8F21-A658C08EFBC7}" type="datetimeFigureOut">
               <a:rPr lang="pl-PL" smtClean="0"/>
-              <a:t>30.12.2020</a:t>
+              <a:t>08.01.2021</a:t>
             </a:fld>
             <a:endParaRPr lang="pl-PL"/>
           </a:p>
@@ -1836,7 +1836,7 @@
           <a:p>
             <a:fld id="{A7AF04E2-1FF2-44AF-8F21-A658C08EFBC7}" type="datetimeFigureOut">
               <a:rPr lang="pl-PL" smtClean="0"/>
-              <a:t>30.12.2020</a:t>
+              <a:t>08.01.2021</a:t>
             </a:fld>
             <a:endParaRPr lang="pl-PL"/>
           </a:p>
@@ -2113,7 +2113,7 @@
           <a:p>
             <a:fld id="{A7AF04E2-1FF2-44AF-8F21-A658C08EFBC7}" type="datetimeFigureOut">
               <a:rPr lang="pl-PL" smtClean="0"/>
-              <a:t>30.12.2020</a:t>
+              <a:t>08.01.2021</a:t>
             </a:fld>
             <a:endParaRPr lang="pl-PL"/>
           </a:p>
@@ -2366,7 +2366,7 @@
           <a:p>
             <a:fld id="{A7AF04E2-1FF2-44AF-8F21-A658C08EFBC7}" type="datetimeFigureOut">
               <a:rPr lang="pl-PL" smtClean="0"/>
-              <a:t>30.12.2020</a:t>
+              <a:t>08.01.2021</a:t>
             </a:fld>
             <a:endParaRPr lang="pl-PL"/>
           </a:p>
@@ -2579,7 +2579,7 @@
           <a:p>
             <a:fld id="{A7AF04E2-1FF2-44AF-8F21-A658C08EFBC7}" type="datetimeFigureOut">
               <a:rPr lang="pl-PL" smtClean="0"/>
-              <a:t>30.12.2020</a:t>
+              <a:t>08.01.2021</a:t>
             </a:fld>
             <a:endParaRPr lang="pl-PL"/>
           </a:p>

</xml_diff>